<commit_message>
flowchart, ddm 내용 추가
</commit_message>
<xml_diff>
--- a/Sequence Diagram.pptx
+++ b/Sequence Diagram.pptx
@@ -8,6 +8,8 @@
     <p:sldId id="256" r:id="rId2"/>
     <p:sldId id="257" r:id="rId3"/>
     <p:sldId id="258" r:id="rId4"/>
+    <p:sldId id="259" r:id="rId5"/>
+    <p:sldId id="260" r:id="rId6"/>
   </p:sldIdLst>
   <p:sldSz cx="9144000" cy="6858000" type="screen4x3"/>
   <p:notesSz cx="6858000" cy="9144000"/>
@@ -106,6 +108,22 @@
       </a:defRPr>
     </a:lvl9pPr>
   </p:defaultTextStyle>
+  <p:extLst>
+    <p:ext uri="{EFAFB233-063F-42B5-8137-9DF3F51BA10A}">
+      <p15:sldGuideLst xmlns:p15="http://schemas.microsoft.com/office/powerpoint/2012/main">
+        <p15:guide id="1" orient="horz" pos="2160">
+          <p15:clr>
+            <a:srgbClr val="A4A3A4"/>
+          </p15:clr>
+        </p15:guide>
+        <p15:guide id="2" pos="2880">
+          <p15:clr>
+            <a:srgbClr val="A4A3A4"/>
+          </p15:clr>
+        </p15:guide>
+      </p15:sldGuideLst>
+    </p:ext>
+  </p:extLst>
 </p:presentation>
 </file>
 
@@ -4519,6 +4537,1283 @@
     <p:extLst>
       <p:ext uri="{BB962C8B-B14F-4D97-AF65-F5344CB8AC3E}">
         <p14:creationId xmlns:p14="http://schemas.microsoft.com/office/powerpoint/2010/main" val="460990934"/>
+      </p:ext>
+    </p:extLst>
+  </p:cSld>
+  <p:clrMapOvr>
+    <a:masterClrMapping/>
+  </p:clrMapOvr>
+</p:sld>
+</file>
+
+<file path=ppt/slides/slide4.xml><?xml version="1.0" encoding="utf-8"?>
+<p:sld xmlns:a="http://schemas.openxmlformats.org/drawingml/2006/main" xmlns:r="http://schemas.openxmlformats.org/officeDocument/2006/relationships" xmlns:p="http://schemas.openxmlformats.org/presentationml/2006/main">
+  <p:cSld>
+    <p:spTree>
+      <p:nvGrpSpPr>
+        <p:cNvPr id="1" name=""/>
+        <p:cNvGrpSpPr/>
+        <p:nvPr/>
+      </p:nvGrpSpPr>
+      <p:grpSpPr>
+        <a:xfrm>
+          <a:off x="0" y="0"/>
+          <a:ext cx="0" cy="0"/>
+          <a:chOff x="0" y="0"/>
+          <a:chExt cx="0" cy="0"/>
+        </a:xfrm>
+      </p:grpSpPr>
+      <p:cxnSp>
+        <p:nvCxnSpPr>
+          <p:cNvPr id="5" name="직선 연결선 4"/>
+          <p:cNvCxnSpPr/>
+          <p:nvPr/>
+        </p:nvCxnSpPr>
+        <p:spPr>
+          <a:xfrm>
+            <a:off x="3419872" y="1196752"/>
+            <a:ext cx="0" cy="4392488"/>
+          </a:xfrm>
+          <a:prstGeom prst="line">
+            <a:avLst/>
+          </a:prstGeom>
+          <a:ln w="38100">
+            <a:solidFill>
+              <a:schemeClr val="tx1"/>
+            </a:solidFill>
+            <a:prstDash val="sysDash"/>
+          </a:ln>
+        </p:spPr>
+        <p:style>
+          <a:lnRef idx="1">
+            <a:schemeClr val="accent1"/>
+          </a:lnRef>
+          <a:fillRef idx="0">
+            <a:schemeClr val="accent1"/>
+          </a:fillRef>
+          <a:effectRef idx="0">
+            <a:schemeClr val="accent1"/>
+          </a:effectRef>
+          <a:fontRef idx="minor">
+            <a:schemeClr val="tx1"/>
+          </a:fontRef>
+        </p:style>
+      </p:cxnSp>
+      <p:cxnSp>
+        <p:nvCxnSpPr>
+          <p:cNvPr id="7" name="직선 연결선 6"/>
+          <p:cNvCxnSpPr/>
+          <p:nvPr/>
+        </p:nvCxnSpPr>
+        <p:spPr>
+          <a:xfrm>
+            <a:off x="720675" y="1196752"/>
+            <a:ext cx="0" cy="4392488"/>
+          </a:xfrm>
+          <a:prstGeom prst="line">
+            <a:avLst/>
+          </a:prstGeom>
+          <a:ln w="38100">
+            <a:solidFill>
+              <a:schemeClr val="tx1"/>
+            </a:solidFill>
+          </a:ln>
+        </p:spPr>
+        <p:style>
+          <a:lnRef idx="1">
+            <a:schemeClr val="accent1"/>
+          </a:lnRef>
+          <a:fillRef idx="0">
+            <a:schemeClr val="accent1"/>
+          </a:fillRef>
+          <a:effectRef idx="0">
+            <a:schemeClr val="accent1"/>
+          </a:effectRef>
+          <a:fontRef idx="minor">
+            <a:schemeClr val="tx1"/>
+          </a:fontRef>
+        </p:style>
+      </p:cxnSp>
+      <p:sp>
+        <p:nvSpPr>
+          <p:cNvPr id="8" name="TextBox 7"/>
+          <p:cNvSpPr txBox="1"/>
+          <p:nvPr/>
+        </p:nvSpPr>
+        <p:spPr>
+          <a:xfrm>
+            <a:off x="4221274" y="5714112"/>
+            <a:ext cx="2786725" cy="369332"/>
+          </a:xfrm>
+          <a:prstGeom prst="rect">
+            <a:avLst/>
+          </a:prstGeom>
+          <a:noFill/>
+        </p:spPr>
+        <p:txBody>
+          <a:bodyPr wrap="none" rtlCol="0">
+            <a:spAutoFit/>
+          </a:bodyPr>
+          <a:lstStyle/>
+          <a:p>
+            <a:r>
+              <a:rPr lang="en-US" altLang="ko-KR" dirty="0" smtClean="0"/>
+              <a:t>Answer Calculate System</a:t>
+            </a:r>
+            <a:endParaRPr lang="ko-KR" altLang="en-US" dirty="0"/>
+          </a:p>
+        </p:txBody>
+      </p:sp>
+      <p:sp>
+        <p:nvSpPr>
+          <p:cNvPr id="9" name="TextBox 8"/>
+          <p:cNvSpPr txBox="1"/>
+          <p:nvPr/>
+        </p:nvSpPr>
+        <p:spPr>
+          <a:xfrm>
+            <a:off x="7725561" y="5697659"/>
+            <a:ext cx="1297150" cy="369332"/>
+          </a:xfrm>
+          <a:prstGeom prst="rect">
+            <a:avLst/>
+          </a:prstGeom>
+          <a:noFill/>
+        </p:spPr>
+        <p:txBody>
+          <a:bodyPr wrap="none" rtlCol="0">
+            <a:spAutoFit/>
+          </a:bodyPr>
+          <a:lstStyle/>
+          <a:p>
+            <a:r>
+              <a:rPr lang="en-US" altLang="ko-KR" dirty="0" err="1" smtClean="0"/>
+              <a:t>Dialogflow</a:t>
+            </a:r>
+            <a:endParaRPr lang="ko-KR" altLang="en-US" dirty="0"/>
+          </a:p>
+        </p:txBody>
+      </p:sp>
+      <p:cxnSp>
+        <p:nvCxnSpPr>
+          <p:cNvPr id="11" name="직선 화살표 연결선 10"/>
+          <p:cNvCxnSpPr/>
+          <p:nvPr/>
+        </p:nvCxnSpPr>
+        <p:spPr>
+          <a:xfrm>
+            <a:off x="3419872" y="2102163"/>
+            <a:ext cx="4893962" cy="0"/>
+          </a:xfrm>
+          <a:prstGeom prst="straightConnector1">
+            <a:avLst/>
+          </a:prstGeom>
+          <a:ln>
+            <a:tailEnd type="arrow"/>
+          </a:ln>
+        </p:spPr>
+        <p:style>
+          <a:lnRef idx="1">
+            <a:schemeClr val="accent1"/>
+          </a:lnRef>
+          <a:fillRef idx="0">
+            <a:schemeClr val="accent1"/>
+          </a:fillRef>
+          <a:effectRef idx="0">
+            <a:schemeClr val="accent1"/>
+          </a:effectRef>
+          <a:fontRef idx="minor">
+            <a:schemeClr val="tx1"/>
+          </a:fontRef>
+        </p:style>
+      </p:cxnSp>
+      <p:cxnSp>
+        <p:nvCxnSpPr>
+          <p:cNvPr id="15" name="직선 화살표 연결선 14"/>
+          <p:cNvCxnSpPr/>
+          <p:nvPr/>
+        </p:nvCxnSpPr>
+        <p:spPr>
+          <a:xfrm>
+            <a:off x="720675" y="1700808"/>
+            <a:ext cx="2699197" cy="0"/>
+          </a:xfrm>
+          <a:prstGeom prst="straightConnector1">
+            <a:avLst/>
+          </a:prstGeom>
+          <a:ln>
+            <a:tailEnd type="arrow"/>
+          </a:ln>
+        </p:spPr>
+        <p:style>
+          <a:lnRef idx="1">
+            <a:schemeClr val="accent1"/>
+          </a:lnRef>
+          <a:fillRef idx="0">
+            <a:schemeClr val="accent1"/>
+          </a:fillRef>
+          <a:effectRef idx="0">
+            <a:schemeClr val="accent1"/>
+          </a:effectRef>
+          <a:fontRef idx="minor">
+            <a:schemeClr val="tx1"/>
+          </a:fontRef>
+        </p:style>
+      </p:cxnSp>
+      <p:sp>
+        <p:nvSpPr>
+          <p:cNvPr id="17" name="TextBox 16"/>
+          <p:cNvSpPr txBox="1"/>
+          <p:nvPr/>
+        </p:nvSpPr>
+        <p:spPr>
+          <a:xfrm>
+            <a:off x="315564" y="5733256"/>
+            <a:ext cx="810222" cy="369332"/>
+          </a:xfrm>
+          <a:prstGeom prst="rect">
+            <a:avLst/>
+          </a:prstGeom>
+          <a:noFill/>
+        </p:spPr>
+        <p:txBody>
+          <a:bodyPr wrap="none" rtlCol="0">
+            <a:spAutoFit/>
+          </a:bodyPr>
+          <a:lstStyle/>
+          <a:p>
+            <a:r>
+              <a:rPr lang="en-US" altLang="ko-KR" smtClean="0"/>
+              <a:t>Player</a:t>
+            </a:r>
+            <a:endParaRPr lang="ko-KR" altLang="en-US"/>
+          </a:p>
+        </p:txBody>
+      </p:sp>
+      <p:sp>
+        <p:nvSpPr>
+          <p:cNvPr id="18" name="TextBox 17"/>
+          <p:cNvSpPr txBox="1"/>
+          <p:nvPr/>
+        </p:nvSpPr>
+        <p:spPr>
+          <a:xfrm>
+            <a:off x="1459400" y="1732831"/>
+            <a:ext cx="1221745" cy="369332"/>
+          </a:xfrm>
+          <a:prstGeom prst="rect">
+            <a:avLst/>
+          </a:prstGeom>
+          <a:noFill/>
+        </p:spPr>
+        <p:txBody>
+          <a:bodyPr wrap="none" rtlCol="0">
+            <a:spAutoFit/>
+          </a:bodyPr>
+          <a:lstStyle/>
+          <a:p>
+            <a:r>
+              <a:rPr lang="en-US" altLang="ko-KR" dirty="0" smtClean="0"/>
+              <a:t>Input Text</a:t>
+            </a:r>
+            <a:endParaRPr lang="ko-KR" altLang="en-US" dirty="0"/>
+          </a:p>
+        </p:txBody>
+      </p:sp>
+      <p:sp>
+        <p:nvSpPr>
+          <p:cNvPr id="19" name="TextBox 18"/>
+          <p:cNvSpPr txBox="1"/>
+          <p:nvPr/>
+        </p:nvSpPr>
+        <p:spPr>
+          <a:xfrm>
+            <a:off x="5751020" y="2780927"/>
+            <a:ext cx="2513958" cy="369332"/>
+          </a:xfrm>
+          <a:prstGeom prst="rect">
+            <a:avLst/>
+          </a:prstGeom>
+          <a:noFill/>
+        </p:spPr>
+        <p:txBody>
+          <a:bodyPr wrap="none" rtlCol="0">
+            <a:spAutoFit/>
+          </a:bodyPr>
+          <a:lstStyle/>
+          <a:p>
+            <a:r>
+              <a:rPr lang="en-US" altLang="ko-KR" dirty="0" smtClean="0"/>
+              <a:t>Deliver a JSON Object</a:t>
+            </a:r>
+            <a:endParaRPr lang="ko-KR" altLang="en-US" dirty="0"/>
+          </a:p>
+        </p:txBody>
+      </p:sp>
+      <p:cxnSp>
+        <p:nvCxnSpPr>
+          <p:cNvPr id="20" name="직선 연결선 19"/>
+          <p:cNvCxnSpPr/>
+          <p:nvPr/>
+        </p:nvCxnSpPr>
+        <p:spPr>
+          <a:xfrm>
+            <a:off x="5584921" y="1196752"/>
+            <a:ext cx="0" cy="792088"/>
+          </a:xfrm>
+          <a:prstGeom prst="line">
+            <a:avLst/>
+          </a:prstGeom>
+          <a:ln w="38100">
+            <a:solidFill>
+              <a:schemeClr val="tx1"/>
+            </a:solidFill>
+            <a:prstDash val="sysDash"/>
+          </a:ln>
+        </p:spPr>
+        <p:style>
+          <a:lnRef idx="1">
+            <a:schemeClr val="accent1"/>
+          </a:lnRef>
+          <a:fillRef idx="0">
+            <a:schemeClr val="accent1"/>
+          </a:fillRef>
+          <a:effectRef idx="0">
+            <a:schemeClr val="accent1"/>
+          </a:effectRef>
+          <a:fontRef idx="minor">
+            <a:schemeClr val="tx1"/>
+          </a:fontRef>
+        </p:style>
+      </p:cxnSp>
+      <p:cxnSp>
+        <p:nvCxnSpPr>
+          <p:cNvPr id="23" name="직선 화살표 연결선 22"/>
+          <p:cNvCxnSpPr/>
+          <p:nvPr/>
+        </p:nvCxnSpPr>
+        <p:spPr>
+          <a:xfrm flipH="1">
+            <a:off x="5614637" y="2780928"/>
+            <a:ext cx="2699197" cy="0"/>
+          </a:xfrm>
+          <a:prstGeom prst="straightConnector1">
+            <a:avLst/>
+          </a:prstGeom>
+          <a:ln>
+            <a:tailEnd type="arrow"/>
+          </a:ln>
+        </p:spPr>
+        <p:style>
+          <a:lnRef idx="1">
+            <a:schemeClr val="accent1"/>
+          </a:lnRef>
+          <a:fillRef idx="0">
+            <a:schemeClr val="accent1"/>
+          </a:fillRef>
+          <a:effectRef idx="0">
+            <a:schemeClr val="accent1"/>
+          </a:effectRef>
+          <a:fontRef idx="minor">
+            <a:schemeClr val="tx1"/>
+          </a:fontRef>
+        </p:style>
+      </p:cxnSp>
+      <p:cxnSp>
+        <p:nvCxnSpPr>
+          <p:cNvPr id="24" name="직선 연결선 23"/>
+          <p:cNvCxnSpPr/>
+          <p:nvPr/>
+        </p:nvCxnSpPr>
+        <p:spPr>
+          <a:xfrm>
+            <a:off x="8374136" y="1196752"/>
+            <a:ext cx="0" cy="4392488"/>
+          </a:xfrm>
+          <a:prstGeom prst="line">
+            <a:avLst/>
+          </a:prstGeom>
+          <a:ln w="38100">
+            <a:solidFill>
+              <a:schemeClr val="tx1"/>
+            </a:solidFill>
+            <a:prstDash val="sysDash"/>
+          </a:ln>
+        </p:spPr>
+        <p:style>
+          <a:lnRef idx="1">
+            <a:schemeClr val="accent1"/>
+          </a:lnRef>
+          <a:fillRef idx="0">
+            <a:schemeClr val="accent1"/>
+          </a:fillRef>
+          <a:effectRef idx="0">
+            <a:schemeClr val="accent1"/>
+          </a:effectRef>
+          <a:fontRef idx="minor">
+            <a:schemeClr val="tx1"/>
+          </a:fontRef>
+        </p:style>
+      </p:cxnSp>
+      <p:sp>
+        <p:nvSpPr>
+          <p:cNvPr id="27" name="TextBox 26"/>
+          <p:cNvSpPr txBox="1"/>
+          <p:nvPr/>
+        </p:nvSpPr>
+        <p:spPr>
+          <a:xfrm>
+            <a:off x="2915816" y="5723964"/>
+            <a:ext cx="1011815" cy="369332"/>
+          </a:xfrm>
+          <a:prstGeom prst="rect">
+            <a:avLst/>
+          </a:prstGeom>
+          <a:noFill/>
+        </p:spPr>
+        <p:txBody>
+          <a:bodyPr wrap="none" rtlCol="0">
+            <a:spAutoFit/>
+          </a:bodyPr>
+          <a:lstStyle/>
+          <a:p>
+            <a:r>
+              <a:rPr lang="en-US" altLang="ko-KR" smtClean="0"/>
+              <a:t>Our Bot</a:t>
+            </a:r>
+            <a:endParaRPr lang="ko-KR" altLang="en-US"/>
+          </a:p>
+        </p:txBody>
+      </p:sp>
+      <p:sp>
+        <p:nvSpPr>
+          <p:cNvPr id="28" name="직사각형 27"/>
+          <p:cNvSpPr/>
+          <p:nvPr/>
+        </p:nvSpPr>
+        <p:spPr>
+          <a:xfrm>
+            <a:off x="720675" y="620688"/>
+            <a:ext cx="7667749" cy="576064"/>
+          </a:xfrm>
+          <a:prstGeom prst="rect">
+            <a:avLst/>
+          </a:prstGeom>
+        </p:spPr>
+        <p:style>
+          <a:lnRef idx="2">
+            <a:schemeClr val="accent1">
+              <a:shade val="50000"/>
+            </a:schemeClr>
+          </a:lnRef>
+          <a:fillRef idx="1">
+            <a:schemeClr val="accent1"/>
+          </a:fillRef>
+          <a:effectRef idx="0">
+            <a:schemeClr val="accent1"/>
+          </a:effectRef>
+          <a:fontRef idx="minor">
+            <a:schemeClr val="lt1"/>
+          </a:fontRef>
+        </p:style>
+        <p:txBody>
+          <a:bodyPr rtlCol="0" anchor="ctr"/>
+          <a:lstStyle/>
+          <a:p>
+            <a:pPr algn="ctr"/>
+            <a:r>
+              <a:rPr lang="en-US" altLang="ko-KR" dirty="0" smtClean="0"/>
+              <a:t>Q&amp;A </a:t>
+            </a:r>
+            <a:r>
+              <a:rPr lang="en-US" altLang="ko-KR" dirty="0" smtClean="0"/>
+              <a:t>Flowchart</a:t>
+            </a:r>
+            <a:endParaRPr lang="ko-KR" altLang="en-US" dirty="0"/>
+          </a:p>
+        </p:txBody>
+      </p:sp>
+      <p:sp>
+        <p:nvSpPr>
+          <p:cNvPr id="29" name="TextBox 28"/>
+          <p:cNvSpPr txBox="1"/>
+          <p:nvPr/>
+        </p:nvSpPr>
+        <p:spPr>
+          <a:xfrm>
+            <a:off x="4784798" y="2077836"/>
+            <a:ext cx="1590628" cy="369332"/>
+          </a:xfrm>
+          <a:prstGeom prst="rect">
+            <a:avLst/>
+          </a:prstGeom>
+          <a:noFill/>
+        </p:spPr>
+        <p:txBody>
+          <a:bodyPr wrap="none" rtlCol="0">
+            <a:spAutoFit/>
+          </a:bodyPr>
+          <a:lstStyle/>
+          <a:p>
+            <a:r>
+              <a:rPr lang="en-US" altLang="ko-KR" dirty="0" smtClean="0"/>
+              <a:t>Deliver String</a:t>
+            </a:r>
+            <a:endParaRPr lang="ko-KR" altLang="en-US" dirty="0"/>
+          </a:p>
+        </p:txBody>
+      </p:sp>
+      <p:cxnSp>
+        <p:nvCxnSpPr>
+          <p:cNvPr id="34" name="직선 화살표 연결선 33"/>
+          <p:cNvCxnSpPr/>
+          <p:nvPr/>
+        </p:nvCxnSpPr>
+        <p:spPr>
+          <a:xfrm flipH="1">
+            <a:off x="3563888" y="4293096"/>
+            <a:ext cx="4810249" cy="0"/>
+          </a:xfrm>
+          <a:prstGeom prst="straightConnector1">
+            <a:avLst/>
+          </a:prstGeom>
+          <a:ln>
+            <a:tailEnd type="arrow"/>
+          </a:ln>
+        </p:spPr>
+        <p:style>
+          <a:lnRef idx="1">
+            <a:schemeClr val="accent1"/>
+          </a:lnRef>
+          <a:fillRef idx="0">
+            <a:schemeClr val="accent1"/>
+          </a:fillRef>
+          <a:effectRef idx="0">
+            <a:schemeClr val="accent1"/>
+          </a:effectRef>
+          <a:fontRef idx="minor">
+            <a:schemeClr val="tx1"/>
+          </a:fontRef>
+        </p:style>
+      </p:cxnSp>
+      <p:cxnSp>
+        <p:nvCxnSpPr>
+          <p:cNvPr id="42" name="직선 연결선 41"/>
+          <p:cNvCxnSpPr/>
+          <p:nvPr/>
+        </p:nvCxnSpPr>
+        <p:spPr>
+          <a:xfrm>
+            <a:off x="5580112" y="4869160"/>
+            <a:ext cx="0" cy="720080"/>
+          </a:xfrm>
+          <a:prstGeom prst="line">
+            <a:avLst/>
+          </a:prstGeom>
+          <a:ln w="38100">
+            <a:solidFill>
+              <a:schemeClr val="tx1"/>
+            </a:solidFill>
+            <a:prstDash val="sysDash"/>
+          </a:ln>
+        </p:spPr>
+        <p:style>
+          <a:lnRef idx="1">
+            <a:schemeClr val="accent1"/>
+          </a:lnRef>
+          <a:fillRef idx="0">
+            <a:schemeClr val="accent1"/>
+          </a:fillRef>
+          <a:effectRef idx="0">
+            <a:schemeClr val="accent1"/>
+          </a:effectRef>
+          <a:fontRef idx="minor">
+            <a:schemeClr val="tx1"/>
+          </a:fontRef>
+        </p:style>
+      </p:cxnSp>
+      <p:sp>
+        <p:nvSpPr>
+          <p:cNvPr id="51" name="TextBox 50"/>
+          <p:cNvSpPr txBox="1"/>
+          <p:nvPr/>
+        </p:nvSpPr>
+        <p:spPr>
+          <a:xfrm>
+            <a:off x="4599256" y="4293096"/>
+            <a:ext cx="2650534" cy="369332"/>
+          </a:xfrm>
+          <a:prstGeom prst="rect">
+            <a:avLst/>
+          </a:prstGeom>
+          <a:noFill/>
+        </p:spPr>
+        <p:txBody>
+          <a:bodyPr wrap="none" rtlCol="0">
+            <a:spAutoFit/>
+          </a:bodyPr>
+          <a:lstStyle/>
+          <a:p>
+            <a:r>
+              <a:rPr lang="en-US" altLang="ko-KR" dirty="0" smtClean="0"/>
+              <a:t>Deliver </a:t>
+            </a:r>
+            <a:r>
+              <a:rPr lang="en-US" altLang="ko-KR" dirty="0" smtClean="0"/>
+              <a:t>a Boolean value</a:t>
+            </a:r>
+            <a:endParaRPr lang="ko-KR" altLang="en-US" dirty="0"/>
+          </a:p>
+        </p:txBody>
+      </p:sp>
+      <p:cxnSp>
+        <p:nvCxnSpPr>
+          <p:cNvPr id="25" name="직선 연결선 24"/>
+          <p:cNvCxnSpPr/>
+          <p:nvPr/>
+        </p:nvCxnSpPr>
+        <p:spPr>
+          <a:xfrm>
+            <a:off x="5580112" y="2471495"/>
+            <a:ext cx="0" cy="1749593"/>
+          </a:xfrm>
+          <a:prstGeom prst="line">
+            <a:avLst/>
+          </a:prstGeom>
+          <a:ln w="38100">
+            <a:solidFill>
+              <a:schemeClr val="tx1"/>
+            </a:solidFill>
+            <a:prstDash val="sysDash"/>
+          </a:ln>
+        </p:spPr>
+        <p:style>
+          <a:lnRef idx="1">
+            <a:schemeClr val="accent1"/>
+          </a:lnRef>
+          <a:fillRef idx="0">
+            <a:schemeClr val="accent1"/>
+          </a:fillRef>
+          <a:effectRef idx="0">
+            <a:schemeClr val="accent1"/>
+          </a:effectRef>
+          <a:fontRef idx="minor">
+            <a:schemeClr val="tx1"/>
+          </a:fontRef>
+        </p:style>
+      </p:cxnSp>
+      <p:cxnSp>
+        <p:nvCxnSpPr>
+          <p:cNvPr id="30" name="직선 화살표 연결선 29"/>
+          <p:cNvCxnSpPr/>
+          <p:nvPr/>
+        </p:nvCxnSpPr>
+        <p:spPr>
+          <a:xfrm flipH="1">
+            <a:off x="3558553" y="3363698"/>
+            <a:ext cx="2021559" cy="0"/>
+          </a:xfrm>
+          <a:prstGeom prst="straightConnector1">
+            <a:avLst/>
+          </a:prstGeom>
+          <a:ln>
+            <a:tailEnd type="arrow"/>
+          </a:ln>
+        </p:spPr>
+        <p:style>
+          <a:lnRef idx="1">
+            <a:schemeClr val="accent1"/>
+          </a:lnRef>
+          <a:fillRef idx="0">
+            <a:schemeClr val="accent1"/>
+          </a:fillRef>
+          <a:effectRef idx="0">
+            <a:schemeClr val="accent1"/>
+          </a:effectRef>
+          <a:fontRef idx="minor">
+            <a:schemeClr val="tx1"/>
+          </a:fontRef>
+        </p:style>
+      </p:cxnSp>
+      <p:sp>
+        <p:nvSpPr>
+          <p:cNvPr id="31" name="TextBox 30"/>
+          <p:cNvSpPr txBox="1"/>
+          <p:nvPr/>
+        </p:nvSpPr>
+        <p:spPr>
+          <a:xfrm>
+            <a:off x="3558553" y="3420022"/>
+            <a:ext cx="1852110" cy="646331"/>
+          </a:xfrm>
+          <a:prstGeom prst="rect">
+            <a:avLst/>
+          </a:prstGeom>
+          <a:noFill/>
+        </p:spPr>
+        <p:txBody>
+          <a:bodyPr wrap="none" rtlCol="0">
+            <a:spAutoFit/>
+          </a:bodyPr>
+          <a:lstStyle/>
+          <a:p>
+            <a:r>
+              <a:rPr lang="en-US" altLang="ko-KR" dirty="0" smtClean="0"/>
+              <a:t>Deliver</a:t>
+            </a:r>
+          </a:p>
+          <a:p>
+            <a:r>
+              <a:rPr lang="en-US" altLang="ko-KR" dirty="0" smtClean="0"/>
+              <a:t>a Boolean value</a:t>
+            </a:r>
+            <a:endParaRPr lang="ko-KR" altLang="en-US" dirty="0"/>
+          </a:p>
+        </p:txBody>
+      </p:sp>
+    </p:spTree>
+    <p:extLst>
+      <p:ext uri="{BB962C8B-B14F-4D97-AF65-F5344CB8AC3E}">
+        <p14:creationId xmlns:p14="http://schemas.microsoft.com/office/powerpoint/2010/main" val="3316971928"/>
+      </p:ext>
+    </p:extLst>
+  </p:cSld>
+  <p:clrMapOvr>
+    <a:masterClrMapping/>
+  </p:clrMapOvr>
+</p:sld>
+</file>
+
+<file path=ppt/slides/slide5.xml><?xml version="1.0" encoding="utf-8"?>
+<p:sld xmlns:a="http://schemas.openxmlformats.org/drawingml/2006/main" xmlns:r="http://schemas.openxmlformats.org/officeDocument/2006/relationships" xmlns:p="http://schemas.openxmlformats.org/presentationml/2006/main">
+  <p:cSld>
+    <p:spTree>
+      <p:nvGrpSpPr>
+        <p:cNvPr id="1" name=""/>
+        <p:cNvGrpSpPr/>
+        <p:nvPr/>
+      </p:nvGrpSpPr>
+      <p:grpSpPr>
+        <a:xfrm>
+          <a:off x="0" y="0"/>
+          <a:ext cx="0" cy="0"/>
+          <a:chOff x="0" y="0"/>
+          <a:chExt cx="0" cy="0"/>
+        </a:xfrm>
+      </p:grpSpPr>
+      <p:cxnSp>
+        <p:nvCxnSpPr>
+          <p:cNvPr id="5" name="직선 연결선 4"/>
+          <p:cNvCxnSpPr/>
+          <p:nvPr/>
+        </p:nvCxnSpPr>
+        <p:spPr>
+          <a:xfrm>
+            <a:off x="4644008" y="1196752"/>
+            <a:ext cx="0" cy="4392488"/>
+          </a:xfrm>
+          <a:prstGeom prst="line">
+            <a:avLst/>
+          </a:prstGeom>
+          <a:ln w="38100">
+            <a:solidFill>
+              <a:schemeClr val="tx1"/>
+            </a:solidFill>
+            <a:prstDash val="sysDash"/>
+          </a:ln>
+        </p:spPr>
+        <p:style>
+          <a:lnRef idx="1">
+            <a:schemeClr val="accent1"/>
+          </a:lnRef>
+          <a:fillRef idx="0">
+            <a:schemeClr val="accent1"/>
+          </a:fillRef>
+          <a:effectRef idx="0">
+            <a:schemeClr val="accent1"/>
+          </a:effectRef>
+          <a:fontRef idx="minor">
+            <a:schemeClr val="tx1"/>
+          </a:fontRef>
+        </p:style>
+      </p:cxnSp>
+      <p:cxnSp>
+        <p:nvCxnSpPr>
+          <p:cNvPr id="7" name="직선 연결선 6"/>
+          <p:cNvCxnSpPr/>
+          <p:nvPr/>
+        </p:nvCxnSpPr>
+        <p:spPr>
+          <a:xfrm>
+            <a:off x="720675" y="1196752"/>
+            <a:ext cx="0" cy="4392488"/>
+          </a:xfrm>
+          <a:prstGeom prst="line">
+            <a:avLst/>
+          </a:prstGeom>
+          <a:ln w="38100">
+            <a:solidFill>
+              <a:schemeClr val="tx1"/>
+            </a:solidFill>
+          </a:ln>
+        </p:spPr>
+        <p:style>
+          <a:lnRef idx="1">
+            <a:schemeClr val="accent1"/>
+          </a:lnRef>
+          <a:fillRef idx="0">
+            <a:schemeClr val="accent1"/>
+          </a:fillRef>
+          <a:effectRef idx="0">
+            <a:schemeClr val="accent1"/>
+          </a:effectRef>
+          <a:fontRef idx="minor">
+            <a:schemeClr val="tx1"/>
+          </a:fontRef>
+        </p:style>
+      </p:cxnSp>
+      <p:sp>
+        <p:nvSpPr>
+          <p:cNvPr id="9" name="TextBox 8"/>
+          <p:cNvSpPr txBox="1"/>
+          <p:nvPr/>
+        </p:nvSpPr>
+        <p:spPr>
+          <a:xfrm>
+            <a:off x="7742392" y="5722937"/>
+            <a:ext cx="1263487" cy="369332"/>
+          </a:xfrm>
+          <a:prstGeom prst="rect">
+            <a:avLst/>
+          </a:prstGeom>
+          <a:noFill/>
+        </p:spPr>
+        <p:txBody>
+          <a:bodyPr wrap="none" rtlCol="0">
+            <a:spAutoFit/>
+          </a:bodyPr>
+          <a:lstStyle/>
+          <a:p>
+            <a:r>
+              <a:rPr lang="en-US" altLang="ko-KR" dirty="0" smtClean="0"/>
+              <a:t>Game Log</a:t>
+            </a:r>
+            <a:endParaRPr lang="ko-KR" altLang="en-US" dirty="0"/>
+          </a:p>
+        </p:txBody>
+      </p:sp>
+      <p:cxnSp>
+        <p:nvCxnSpPr>
+          <p:cNvPr id="15" name="직선 화살표 연결선 14"/>
+          <p:cNvCxnSpPr/>
+          <p:nvPr/>
+        </p:nvCxnSpPr>
+        <p:spPr>
+          <a:xfrm>
+            <a:off x="720675" y="1700808"/>
+            <a:ext cx="3878581" cy="0"/>
+          </a:xfrm>
+          <a:prstGeom prst="straightConnector1">
+            <a:avLst/>
+          </a:prstGeom>
+          <a:ln>
+            <a:tailEnd type="arrow"/>
+          </a:ln>
+        </p:spPr>
+        <p:style>
+          <a:lnRef idx="1">
+            <a:schemeClr val="accent1"/>
+          </a:lnRef>
+          <a:fillRef idx="0">
+            <a:schemeClr val="accent1"/>
+          </a:fillRef>
+          <a:effectRef idx="0">
+            <a:schemeClr val="accent1"/>
+          </a:effectRef>
+          <a:fontRef idx="minor">
+            <a:schemeClr val="tx1"/>
+          </a:fontRef>
+        </p:style>
+      </p:cxnSp>
+      <p:sp>
+        <p:nvSpPr>
+          <p:cNvPr id="17" name="TextBox 16"/>
+          <p:cNvSpPr txBox="1"/>
+          <p:nvPr/>
+        </p:nvSpPr>
+        <p:spPr>
+          <a:xfrm>
+            <a:off x="315564" y="5733256"/>
+            <a:ext cx="810222" cy="369332"/>
+          </a:xfrm>
+          <a:prstGeom prst="rect">
+            <a:avLst/>
+          </a:prstGeom>
+          <a:noFill/>
+        </p:spPr>
+        <p:txBody>
+          <a:bodyPr wrap="none" rtlCol="0">
+            <a:spAutoFit/>
+          </a:bodyPr>
+          <a:lstStyle/>
+          <a:p>
+            <a:r>
+              <a:rPr lang="en-US" altLang="ko-KR" smtClean="0"/>
+              <a:t>Player</a:t>
+            </a:r>
+            <a:endParaRPr lang="ko-KR" altLang="en-US"/>
+          </a:p>
+        </p:txBody>
+      </p:sp>
+      <p:sp>
+        <p:nvSpPr>
+          <p:cNvPr id="18" name="TextBox 17"/>
+          <p:cNvSpPr txBox="1"/>
+          <p:nvPr/>
+        </p:nvSpPr>
+        <p:spPr>
+          <a:xfrm>
+            <a:off x="1712688" y="1700808"/>
+            <a:ext cx="1896673" cy="369332"/>
+          </a:xfrm>
+          <a:prstGeom prst="rect">
+            <a:avLst/>
+          </a:prstGeom>
+          <a:noFill/>
+        </p:spPr>
+        <p:txBody>
+          <a:bodyPr wrap="none" rtlCol="0">
+            <a:spAutoFit/>
+          </a:bodyPr>
+          <a:lstStyle/>
+          <a:p>
+            <a:r>
+              <a:rPr lang="en-US" altLang="ko-KR" dirty="0" smtClean="0"/>
+              <a:t>Input Command</a:t>
+            </a:r>
+            <a:endParaRPr lang="ko-KR" altLang="en-US" dirty="0"/>
+          </a:p>
+        </p:txBody>
+      </p:sp>
+      <p:sp>
+        <p:nvSpPr>
+          <p:cNvPr id="19" name="TextBox 18"/>
+          <p:cNvSpPr txBox="1"/>
+          <p:nvPr/>
+        </p:nvSpPr>
+        <p:spPr>
+          <a:xfrm>
+            <a:off x="5476885" y="2339588"/>
+            <a:ext cx="2248949" cy="369332"/>
+          </a:xfrm>
+          <a:prstGeom prst="rect">
+            <a:avLst/>
+          </a:prstGeom>
+          <a:noFill/>
+        </p:spPr>
+        <p:txBody>
+          <a:bodyPr wrap="none" rtlCol="0">
+            <a:spAutoFit/>
+          </a:bodyPr>
+          <a:lstStyle/>
+          <a:p>
+            <a:r>
+              <a:rPr lang="en-US" altLang="ko-KR" dirty="0" smtClean="0"/>
+              <a:t>Interpret Command</a:t>
+            </a:r>
+            <a:endParaRPr lang="ko-KR" altLang="en-US" dirty="0"/>
+          </a:p>
+        </p:txBody>
+      </p:sp>
+      <p:cxnSp>
+        <p:nvCxnSpPr>
+          <p:cNvPr id="23" name="직선 화살표 연결선 22"/>
+          <p:cNvCxnSpPr/>
+          <p:nvPr/>
+        </p:nvCxnSpPr>
+        <p:spPr>
+          <a:xfrm>
+            <a:off x="4644008" y="2343472"/>
+            <a:ext cx="3669826" cy="0"/>
+          </a:xfrm>
+          <a:prstGeom prst="straightConnector1">
+            <a:avLst/>
+          </a:prstGeom>
+          <a:ln>
+            <a:tailEnd type="arrow"/>
+          </a:ln>
+        </p:spPr>
+        <p:style>
+          <a:lnRef idx="1">
+            <a:schemeClr val="accent1"/>
+          </a:lnRef>
+          <a:fillRef idx="0">
+            <a:schemeClr val="accent1"/>
+          </a:fillRef>
+          <a:effectRef idx="0">
+            <a:schemeClr val="accent1"/>
+          </a:effectRef>
+          <a:fontRef idx="minor">
+            <a:schemeClr val="tx1"/>
+          </a:fontRef>
+        </p:style>
+      </p:cxnSp>
+      <p:cxnSp>
+        <p:nvCxnSpPr>
+          <p:cNvPr id="24" name="직선 연결선 23"/>
+          <p:cNvCxnSpPr/>
+          <p:nvPr/>
+        </p:nvCxnSpPr>
+        <p:spPr>
+          <a:xfrm>
+            <a:off x="8374136" y="1196752"/>
+            <a:ext cx="0" cy="4392488"/>
+          </a:xfrm>
+          <a:prstGeom prst="line">
+            <a:avLst/>
+          </a:prstGeom>
+          <a:ln w="38100">
+            <a:solidFill>
+              <a:schemeClr val="tx1"/>
+            </a:solidFill>
+            <a:prstDash val="sysDash"/>
+          </a:ln>
+        </p:spPr>
+        <p:style>
+          <a:lnRef idx="1">
+            <a:schemeClr val="accent1"/>
+          </a:lnRef>
+          <a:fillRef idx="0">
+            <a:schemeClr val="accent1"/>
+          </a:fillRef>
+          <a:effectRef idx="0">
+            <a:schemeClr val="accent1"/>
+          </a:effectRef>
+          <a:fontRef idx="minor">
+            <a:schemeClr val="tx1"/>
+          </a:fontRef>
+        </p:style>
+      </p:cxnSp>
+      <p:sp>
+        <p:nvSpPr>
+          <p:cNvPr id="27" name="TextBox 26"/>
+          <p:cNvSpPr txBox="1"/>
+          <p:nvPr/>
+        </p:nvSpPr>
+        <p:spPr>
+          <a:xfrm>
+            <a:off x="4093348" y="5680568"/>
+            <a:ext cx="1011815" cy="369332"/>
+          </a:xfrm>
+          <a:prstGeom prst="rect">
+            <a:avLst/>
+          </a:prstGeom>
+          <a:noFill/>
+        </p:spPr>
+        <p:txBody>
+          <a:bodyPr wrap="none" rtlCol="0">
+            <a:spAutoFit/>
+          </a:bodyPr>
+          <a:lstStyle/>
+          <a:p>
+            <a:r>
+              <a:rPr lang="en-US" altLang="ko-KR" dirty="0" smtClean="0"/>
+              <a:t>Our Bot</a:t>
+            </a:r>
+            <a:endParaRPr lang="ko-KR" altLang="en-US" dirty="0"/>
+          </a:p>
+        </p:txBody>
+      </p:sp>
+      <p:sp>
+        <p:nvSpPr>
+          <p:cNvPr id="28" name="직사각형 27"/>
+          <p:cNvSpPr/>
+          <p:nvPr/>
+        </p:nvSpPr>
+        <p:spPr>
+          <a:xfrm>
+            <a:off x="720675" y="620688"/>
+            <a:ext cx="7667749" cy="576064"/>
+          </a:xfrm>
+          <a:prstGeom prst="rect">
+            <a:avLst/>
+          </a:prstGeom>
+        </p:spPr>
+        <p:style>
+          <a:lnRef idx="2">
+            <a:schemeClr val="accent1">
+              <a:shade val="50000"/>
+            </a:schemeClr>
+          </a:lnRef>
+          <a:fillRef idx="1">
+            <a:schemeClr val="accent1"/>
+          </a:fillRef>
+          <a:effectRef idx="0">
+            <a:schemeClr val="accent1"/>
+          </a:effectRef>
+          <a:fontRef idx="minor">
+            <a:schemeClr val="lt1"/>
+          </a:fontRef>
+        </p:style>
+        <p:txBody>
+          <a:bodyPr rtlCol="0" anchor="ctr"/>
+          <a:lstStyle/>
+          <a:p>
+            <a:pPr algn="ctr"/>
+            <a:r>
+              <a:rPr lang="en-US" altLang="ko-KR" dirty="0" smtClean="0"/>
+              <a:t>Help/Log Flowchart</a:t>
+            </a:r>
+            <a:endParaRPr lang="ko-KR" altLang="en-US" dirty="0"/>
+          </a:p>
+        </p:txBody>
+      </p:sp>
+      <p:cxnSp>
+        <p:nvCxnSpPr>
+          <p:cNvPr id="34" name="직선 화살표 연결선 33"/>
+          <p:cNvCxnSpPr/>
+          <p:nvPr/>
+        </p:nvCxnSpPr>
+        <p:spPr>
+          <a:xfrm flipH="1">
+            <a:off x="4644008" y="4293096"/>
+            <a:ext cx="3730130" cy="0"/>
+          </a:xfrm>
+          <a:prstGeom prst="straightConnector1">
+            <a:avLst/>
+          </a:prstGeom>
+          <a:ln>
+            <a:tailEnd type="arrow"/>
+          </a:ln>
+        </p:spPr>
+        <p:style>
+          <a:lnRef idx="1">
+            <a:schemeClr val="accent1"/>
+          </a:lnRef>
+          <a:fillRef idx="0">
+            <a:schemeClr val="accent1"/>
+          </a:fillRef>
+          <a:effectRef idx="0">
+            <a:schemeClr val="accent1"/>
+          </a:effectRef>
+          <a:fontRef idx="minor">
+            <a:schemeClr val="tx1"/>
+          </a:fontRef>
+        </p:style>
+      </p:cxnSp>
+      <p:cxnSp>
+        <p:nvCxnSpPr>
+          <p:cNvPr id="37" name="직선 화살표 연결선 36"/>
+          <p:cNvCxnSpPr/>
+          <p:nvPr/>
+        </p:nvCxnSpPr>
+        <p:spPr>
+          <a:xfrm flipH="1">
+            <a:off x="720676" y="4869160"/>
+            <a:ext cx="3878580" cy="0"/>
+          </a:xfrm>
+          <a:prstGeom prst="straightConnector1">
+            <a:avLst/>
+          </a:prstGeom>
+          <a:ln>
+            <a:tailEnd type="arrow"/>
+          </a:ln>
+        </p:spPr>
+        <p:style>
+          <a:lnRef idx="1">
+            <a:schemeClr val="accent1"/>
+          </a:lnRef>
+          <a:fillRef idx="0">
+            <a:schemeClr val="accent1"/>
+          </a:fillRef>
+          <a:effectRef idx="0">
+            <a:schemeClr val="accent1"/>
+          </a:effectRef>
+          <a:fontRef idx="minor">
+            <a:schemeClr val="tx1"/>
+          </a:fontRef>
+        </p:style>
+      </p:cxnSp>
+      <p:sp>
+        <p:nvSpPr>
+          <p:cNvPr id="51" name="TextBox 50"/>
+          <p:cNvSpPr txBox="1"/>
+          <p:nvPr/>
+        </p:nvSpPr>
+        <p:spPr>
+          <a:xfrm>
+            <a:off x="5330640" y="4293095"/>
+            <a:ext cx="2356864" cy="369332"/>
+          </a:xfrm>
+          <a:prstGeom prst="rect">
+            <a:avLst/>
+          </a:prstGeom>
+          <a:noFill/>
+        </p:spPr>
+        <p:txBody>
+          <a:bodyPr wrap="none" rtlCol="0">
+            <a:spAutoFit/>
+          </a:bodyPr>
+          <a:lstStyle/>
+          <a:p>
+            <a:r>
+              <a:rPr lang="en-US" altLang="ko-KR" dirty="0" smtClean="0"/>
+              <a:t>Deliver the </a:t>
+            </a:r>
+            <a:r>
+              <a:rPr lang="en-US" altLang="ko-KR" dirty="0"/>
+              <a:t>L</a:t>
+            </a:r>
+            <a:r>
+              <a:rPr lang="en-US" altLang="ko-KR" dirty="0" smtClean="0"/>
+              <a:t>og </a:t>
+            </a:r>
+            <a:r>
+              <a:rPr lang="en-US" altLang="ko-KR" dirty="0"/>
+              <a:t>D</a:t>
+            </a:r>
+            <a:r>
+              <a:rPr lang="en-US" altLang="ko-KR" dirty="0" smtClean="0"/>
+              <a:t>ata</a:t>
+            </a:r>
+            <a:endParaRPr lang="ko-KR" altLang="en-US" dirty="0"/>
+          </a:p>
+        </p:txBody>
+      </p:sp>
+      <p:sp>
+        <p:nvSpPr>
+          <p:cNvPr id="52" name="TextBox 51"/>
+          <p:cNvSpPr txBox="1"/>
+          <p:nvPr/>
+        </p:nvSpPr>
+        <p:spPr>
+          <a:xfrm>
+            <a:off x="1809756" y="4869160"/>
+            <a:ext cx="1665841" cy="369332"/>
+          </a:xfrm>
+          <a:prstGeom prst="rect">
+            <a:avLst/>
+          </a:prstGeom>
+          <a:noFill/>
+        </p:spPr>
+        <p:txBody>
+          <a:bodyPr wrap="none" rtlCol="0">
+            <a:spAutoFit/>
+          </a:bodyPr>
+          <a:lstStyle/>
+          <a:p>
+            <a:r>
+              <a:rPr lang="en-US" altLang="ko-KR" dirty="0" smtClean="0"/>
+              <a:t>Print Message</a:t>
+            </a:r>
+            <a:endParaRPr lang="ko-KR" altLang="en-US" dirty="0"/>
+          </a:p>
+        </p:txBody>
+      </p:sp>
+    </p:spTree>
+    <p:extLst>
+      <p:ext uri="{BB962C8B-B14F-4D97-AF65-F5344CB8AC3E}">
+        <p14:creationId xmlns:p14="http://schemas.microsoft.com/office/powerpoint/2010/main" val="319856748"/>
       </p:ext>
     </p:extLst>
   </p:cSld>

</xml_diff>